<commit_message>
finalized final slides after team review
</commit_message>
<xml_diff>
--- a/Final Presentation Slides/Team_6_Final_Slides.pptx
+++ b/Final Presentation Slides/Team_6_Final_Slides.pptx
@@ -2736,7 +2736,7 @@
           <a:p>
             <a:r>
               <a:rPr lang="en-US" dirty="0"/>
-              <a:t>Here is a summary of the model performance. The highest AUC was reached by Logistic Regression with 97.1 percent. The most important features are very consistent across all models with online boarding, inflight </a:t>
+              <a:t>Here is a summary of the model performance. The highest AUC was reached by Logistic Regression with 0.919 so this was our selected model, it performed very similarly on the test set with an AUC of 0.972. The most important features are very consistent across all models with online boarding, inflight </a:t>
             </a:r>
             <a:r>
               <a:rPr lang="en-US" dirty="0" err="1"/>
@@ -2917,7 +2917,23 @@
             </a:r>
             <a:r>
               <a:rPr lang="en-US" dirty="0"/>
-              <a:t>, inflight.wifi.service5, and online.boarding4 and 5. </a:t>
+              <a:t>, </a:t>
+            </a:r>
+            <a:r>
+              <a:rPr lang="en-US" dirty="0" err="1"/>
+              <a:t>inflight.wifi.service</a:t>
+            </a:r>
+            <a:r>
+              <a:rPr lang="en-US" dirty="0"/>
+              <a:t>, and </a:t>
+            </a:r>
+            <a:r>
+              <a:rPr lang="en-US" dirty="0" err="1"/>
+              <a:t>online.boarding</a:t>
+            </a:r>
+            <a:r>
+              <a:rPr lang="en-US" dirty="0"/>
+              <a:t>. </a:t>
             </a:r>
           </a:p>
           <a:p>
@@ -2936,7 +2952,7 @@
             </a:r>
             <a:r>
               <a:rPr lang="en-US" dirty="0"/>
-              <a:t> service and online boarding can be controlled by airlines. This would suggest that providing free good </a:t>
+              <a:t> service and online boarding can be controlled by airlines. This would suggest that investing in good complimentary high speed </a:t>
             </a:r>
             <a:r>
               <a:rPr lang="en-US" dirty="0" err="1"/>
@@ -7461,7 +7477,7 @@
         </p:blipFill>
         <p:spPr>
           <a:xfrm>
-            <a:off x="1" y="0"/>
+            <a:off x="0" y="0"/>
             <a:ext cx="2057400" cy="2057400"/>
           </a:xfrm>
           <a:prstGeom prst="ellipse">
@@ -9894,7 +9910,7 @@
             <p:ph idx="1"/>
             <p:extLst>
               <p:ext uri="{D42A27DB-BD31-4B8C-83A1-F6EECF244321}">
-                <p14:modId xmlns:p14="http://schemas.microsoft.com/office/powerpoint/2010/main" val="1481046967"/>
+                <p14:modId xmlns:p14="http://schemas.microsoft.com/office/powerpoint/2010/main" val="3914922068"/>
               </p:ext>
             </p:extLst>
           </p:nvPr>
@@ -9997,6 +10013,126 @@
                     <a:bodyPr/>
                     <a:lstStyle/>
                     <a:p>
+                      <a:pPr marL="0" marR="0" lvl="0" indent="0" algn="l" defTabSz="914400" rtl="0" eaLnBrk="1" fontAlgn="auto" latinLnBrk="0" hangingPunct="1">
+                        <a:lnSpc>
+                          <a:spcPct val="100000"/>
+                        </a:lnSpc>
+                        <a:spcBef>
+                          <a:spcPts val="0"/>
+                        </a:spcBef>
+                        <a:spcAft>
+                          <a:spcPts val="0"/>
+                        </a:spcAft>
+                        <a:buClrTx/>
+                        <a:buSzTx/>
+                        <a:buFontTx/>
+                        <a:buNone/>
+                        <a:tabLst/>
+                        <a:defRPr/>
+                      </a:pPr>
+                      <a:r>
+                        <a:rPr lang="en-US" sz="1800" b="1" i="0" u="none" strike="noStrike" kern="1200" dirty="0">
+                          <a:solidFill>
+                            <a:schemeClr val="dk1"/>
+                          </a:solidFill>
+                          <a:effectLst/>
+                          <a:latin typeface="+mn-lt"/>
+                          <a:ea typeface="+mn-ea"/>
+                          <a:cs typeface="+mn-cs"/>
+                        </a:rPr>
+                        <a:t>Online.boarding4 and 5 (+)</a:t>
+                      </a:r>
+                      <a:endParaRPr lang="en-US" b="1" dirty="0">
+                        <a:effectLst/>
+                      </a:endParaRPr>
+                    </a:p>
+                    <a:p>
+                      <a:pPr marL="0" marR="0" lvl="0" indent="0" algn="l" defTabSz="914400" rtl="0" eaLnBrk="1" fontAlgn="auto" latinLnBrk="0" hangingPunct="1">
+                        <a:lnSpc>
+                          <a:spcPct val="100000"/>
+                        </a:lnSpc>
+                        <a:spcBef>
+                          <a:spcPts val="0"/>
+                        </a:spcBef>
+                        <a:spcAft>
+                          <a:spcPts val="0"/>
+                        </a:spcAft>
+                        <a:buClrTx/>
+                        <a:buSzTx/>
+                        <a:buFontTx/>
+                        <a:buNone/>
+                        <a:tabLst/>
+                        <a:defRPr/>
+                      </a:pPr>
+                      <a:r>
+                        <a:rPr lang="en-US" sz="1800" b="1" i="0" u="none" strike="noStrike" kern="1200" dirty="0" err="1">
+                          <a:solidFill>
+                            <a:schemeClr val="dk1"/>
+                          </a:solidFill>
+                          <a:effectLst/>
+                          <a:latin typeface="+mn-lt"/>
+                          <a:ea typeface="+mn-ea"/>
+                          <a:cs typeface="+mn-cs"/>
+                        </a:rPr>
+                        <a:t>Type.of.Travel</a:t>
+                      </a:r>
+                      <a:r>
+                        <a:rPr lang="en-US" sz="1800" b="1" i="0" u="none" strike="noStrike" kern="1200" dirty="0">
+                          <a:solidFill>
+                            <a:schemeClr val="dk1"/>
+                          </a:solidFill>
+                          <a:effectLst/>
+                          <a:latin typeface="+mn-lt"/>
+                          <a:ea typeface="+mn-ea"/>
+                          <a:cs typeface="+mn-cs"/>
+                        </a:rPr>
+                        <a:t> Personal Travel (-)</a:t>
+                      </a:r>
+                      <a:endParaRPr lang="en-US" b="1" dirty="0">
+                        <a:effectLst/>
+                      </a:endParaRPr>
+                    </a:p>
+                    <a:p>
+                      <a:pPr marL="0" marR="0" lvl="0" indent="0" algn="l" defTabSz="914400" rtl="0" eaLnBrk="1" fontAlgn="auto" latinLnBrk="0" hangingPunct="1">
+                        <a:lnSpc>
+                          <a:spcPct val="100000"/>
+                        </a:lnSpc>
+                        <a:spcBef>
+                          <a:spcPts val="0"/>
+                        </a:spcBef>
+                        <a:spcAft>
+                          <a:spcPts val="0"/>
+                        </a:spcAft>
+                        <a:buClrTx/>
+                        <a:buSzTx/>
+                        <a:buFontTx/>
+                        <a:buNone/>
+                        <a:tabLst/>
+                        <a:defRPr/>
+                      </a:pPr>
+                      <a:r>
+                        <a:rPr lang="en-US" sz="1800" b="1" i="0" u="none" strike="noStrike" kern="1200" dirty="0">
+                          <a:solidFill>
+                            <a:schemeClr val="dk1"/>
+                          </a:solidFill>
+                          <a:effectLst/>
+                          <a:latin typeface="+mn-lt"/>
+                          <a:ea typeface="+mn-ea"/>
+                          <a:cs typeface="+mn-cs"/>
+                        </a:rPr>
+                        <a:t>Inflight.wifi.service4 and 5 (+)</a:t>
+                      </a:r>
+                      <a:endParaRPr lang="en-US" sz="1800" b="0" i="0" u="none" strike="noStrike" kern="1200" dirty="0">
+                        <a:solidFill>
+                          <a:schemeClr val="dk1"/>
+                        </a:solidFill>
+                        <a:effectLst/>
+                        <a:latin typeface="+mn-lt"/>
+                        <a:ea typeface="+mn-ea"/>
+                        <a:cs typeface="+mn-cs"/>
+                      </a:endParaRPr>
+                    </a:p>
+                    <a:p>
                       <a:pPr rtl="0"/>
                       <a:r>
                         <a:rPr lang="en-US" sz="1800" b="0" i="0" u="none" strike="noStrike" kern="1200" dirty="0" err="1">
@@ -10023,72 +10159,6 @@
                         <a:t> (+)</a:t>
                       </a:r>
                       <a:endParaRPr lang="en-US" b="0" dirty="0">
-                        <a:effectLst/>
-                      </a:endParaRPr>
-                    </a:p>
-                    <a:p>
-                      <a:pPr rtl="0"/>
-                      <a:r>
-                        <a:rPr lang="en-US" sz="1800" b="1" i="0" u="none" strike="noStrike" kern="1200" dirty="0">
-                          <a:solidFill>
-                            <a:schemeClr val="dk1"/>
-                          </a:solidFill>
-                          <a:effectLst/>
-                          <a:latin typeface="+mn-lt"/>
-                          <a:ea typeface="+mn-ea"/>
-                          <a:cs typeface="+mn-cs"/>
-                        </a:rPr>
-                        <a:t>Inflight.wifi.service5 (+)</a:t>
-                      </a:r>
-                      <a:endParaRPr lang="en-US" b="1" dirty="0">
-                        <a:effectLst/>
-                      </a:endParaRPr>
-                    </a:p>
-                    <a:p>
-                      <a:pPr rtl="0"/>
-                      <a:r>
-                        <a:rPr lang="en-US" sz="1800" b="1" i="0" u="none" strike="noStrike" kern="1200" dirty="0">
-                          <a:solidFill>
-                            <a:schemeClr val="dk1"/>
-                          </a:solidFill>
-                          <a:effectLst/>
-                          <a:latin typeface="+mn-lt"/>
-                          <a:ea typeface="+mn-ea"/>
-                          <a:cs typeface="+mn-cs"/>
-                        </a:rPr>
-                        <a:t>Online.boarding4 and 5 (+)</a:t>
-                      </a:r>
-                      <a:endParaRPr lang="en-US" b="1" dirty="0">
-                        <a:effectLst/>
-                      </a:endParaRPr>
-                    </a:p>
-                    <a:p>
-                      <a:pPr rtl="0"/>
-                      <a:r>
-                        <a:rPr lang="en-US" sz="1800" b="1" i="0" u="none" strike="noStrike" kern="1200" dirty="0" err="1">
-                          <a:solidFill>
-                            <a:schemeClr val="dk1"/>
-                          </a:solidFill>
-                          <a:effectLst/>
-                          <a:latin typeface="+mn-lt"/>
-                          <a:ea typeface="+mn-ea"/>
-                          <a:cs typeface="+mn-cs"/>
-                        </a:rPr>
-                        <a:t>Type.of.Travel</a:t>
-                      </a:r>
-                      <a:r>
-                        <a:rPr lang="en-US" sz="1800" b="1" i="0" u="none" strike="noStrike" kern="1200" dirty="0">
-                          <a:solidFill>
-                            <a:schemeClr val="dk1"/>
-                          </a:solidFill>
-                          <a:effectLst/>
-                          <a:latin typeface="+mn-lt"/>
-                          <a:ea typeface="+mn-ea"/>
-                          <a:cs typeface="+mn-cs"/>
-                        </a:rPr>
-                        <a:t> Personal Travel (-)</a:t>
-                      </a:r>
-                      <a:endParaRPr lang="en-US" b="1" dirty="0">
                         <a:effectLst/>
                       </a:endParaRPr>
                     </a:p>
@@ -10126,10 +10196,23 @@
                           <a:ea typeface="+mn-ea"/>
                           <a:cs typeface="+mn-cs"/>
                         </a:rPr>
-                        <a:t>AUC: 97.1%</a:t>
+                        <a:t>Validation AUC: 0.971</a:t>
                       </a:r>
                     </a:p>
                     <a:p>
+                      <a:pPr rtl="0" fontAlgn="base"/>
+                      <a:r>
+                        <a:rPr lang="en-US" sz="1800" b="0" i="0" u="none" strike="noStrike" kern="1200" dirty="0">
+                          <a:solidFill>
+                            <a:schemeClr val="dk1"/>
+                          </a:solidFill>
+                          <a:effectLst/>
+                          <a:latin typeface="+mn-lt"/>
+                          <a:ea typeface="+mn-ea"/>
+                          <a:cs typeface="+mn-cs"/>
+                        </a:rPr>
+                        <a:t>Test AUC: 0.972</a:t>
+                      </a:r>
                       <a:endParaRPr lang="en-US" dirty="0"/>
                     </a:p>
                   </a:txBody>
@@ -10337,7 +10420,7 @@
                           <a:ea typeface="+mn-ea"/>
                           <a:cs typeface="+mn-cs"/>
                         </a:rPr>
-                        <a:t>Accuracy: 86.1% (CV on Train +Validation)</a:t>
+                        <a:t>Accuracy: 89.0% (validation)</a:t>
                       </a:r>
                     </a:p>
                     <a:p>
@@ -10352,7 +10435,7 @@
                           <a:ea typeface="+mn-ea"/>
                           <a:cs typeface="+mn-cs"/>
                         </a:rPr>
-                        <a:t>AUC: 96.2%</a:t>
+                        <a:t>AUC: 0.962</a:t>
                       </a:r>
                     </a:p>
                     <a:p>
@@ -10473,18 +10556,6 @@
                     <a:p>
                       <a:pPr rtl="0" fontAlgn="base"/>
                       <a:r>
-                        <a:rPr lang="fr-FR" sz="1800" b="0" i="0" u="none" strike="noStrike" kern="1200" dirty="0">
-                          <a:solidFill>
-                            <a:schemeClr val="dk1"/>
-                          </a:solidFill>
-                          <a:effectLst/>
-                          <a:latin typeface="+mn-lt"/>
-                          <a:ea typeface="+mn-ea"/>
-                          <a:cs typeface="+mn-cs"/>
-                        </a:rPr>
-                        <a:t>86.3% (CV on </a:t>
-                      </a:r>
-                      <a:r>
                         <a:rPr lang="fr-FR" sz="1800" b="0" i="0" u="none" strike="noStrike" kern="1200" dirty="0" err="1">
                           <a:solidFill>
                             <a:schemeClr val="dk1"/>
@@ -10494,7 +10565,7 @@
                           <a:ea typeface="+mn-ea"/>
                           <a:cs typeface="+mn-cs"/>
                         </a:rPr>
-                        <a:t>Train+Validation</a:t>
+                        <a:t>Accuracy</a:t>
                       </a:r>
                       <a:r>
                         <a:rPr lang="fr-FR" sz="1800" b="0" i="0" u="none" strike="noStrike" kern="1200" dirty="0">
@@ -10506,7 +10577,7 @@
                           <a:ea typeface="+mn-ea"/>
                           <a:cs typeface="+mn-cs"/>
                         </a:rPr>
-                        <a:t>)</a:t>
+                        <a:t>: 86.2% (validation)</a:t>
                       </a:r>
                     </a:p>
                     <a:p>
@@ -10521,7 +10592,7 @@
                           <a:ea typeface="+mn-ea"/>
                           <a:cs typeface="+mn-cs"/>
                         </a:rPr>
-                        <a:t>AUC - </a:t>
+                        <a:t>AUC: 0.886 </a:t>
                       </a:r>
                     </a:p>
                   </a:txBody>
@@ -10681,7 +10752,7 @@
                           <a:ea typeface="+mn-ea"/>
                           <a:cs typeface="+mn-cs"/>
                         </a:rPr>
-                        <a:t>AUC: 96.9%</a:t>
+                        <a:t>AUC: 0.969</a:t>
                       </a:r>
                     </a:p>
                     <a:p>
@@ -10848,21 +10919,21 @@
           <a:p>
             <a:r>
               <a:rPr lang="en-US" dirty="0"/>
-              <a:t> </a:t>
+              <a:t>Investing in complimentary </a:t>
             </a:r>
             <a:r>
               <a:rPr lang="en-US" dirty="0" err="1"/>
-              <a:t>Wifi</a:t>
+              <a:t>wifi</a:t>
             </a:r>
             <a:r>
               <a:rPr lang="en-US" dirty="0"/>
-              <a:t> service and online boarding can be controlled by airlines.</a:t>
+              <a:t> would be a worthwhile investment</a:t>
             </a:r>
           </a:p>
           <a:p>
             <a:r>
               <a:rPr lang="en-US" dirty="0"/>
-              <a:t>Airlines have no control over whether people are traveling for personal or business reasons.</a:t>
+              <a:t>Money may be better spent trying to attract business travelers instead of people traveling for personal reasons.</a:t>
             </a:r>
           </a:p>
         </p:txBody>

</xml_diff>